<commit_message>
alterações finais para apresentação
</commit_message>
<xml_diff>
--- a/Apresentação site Never Give Up.pptx
+++ b/Apresentação site Never Give Up.pptx
@@ -114,6 +114,11 @@
       </a:defRPr>
     </a:lvl9pPr>
   </p:defaultTextStyle>
+  <p:extLst>
+    <p:ext uri="{EFAFB233-063F-42B5-8137-9DF3F51BA10A}">
+      <p15:sldGuideLst xmlns:p15="http://schemas.microsoft.com/office/powerpoint/2012/main"/>
+    </p:ext>
+  </p:extLst>
 </p:presentation>
 </file>
 
@@ -264,7 +269,7 @@
           <a:p>
             <a:fld id="{98F4D1EC-0385-4CF8-B82D-4C32D76D4122}" type="datetimeFigureOut">
               <a:rPr lang="pt-BR" smtClean="0"/>
-              <a:t>05/06/2021</a:t>
+              <a:t>07/06/2021</a:t>
             </a:fld>
             <a:endParaRPr lang="pt-BR"/>
           </a:p>
@@ -462,7 +467,7 @@
           <a:p>
             <a:fld id="{98F4D1EC-0385-4CF8-B82D-4C32D76D4122}" type="datetimeFigureOut">
               <a:rPr lang="pt-BR" smtClean="0"/>
-              <a:t>05/06/2021</a:t>
+              <a:t>07/06/2021</a:t>
             </a:fld>
             <a:endParaRPr lang="pt-BR"/>
           </a:p>
@@ -670,7 +675,7 @@
           <a:p>
             <a:fld id="{98F4D1EC-0385-4CF8-B82D-4C32D76D4122}" type="datetimeFigureOut">
               <a:rPr lang="pt-BR" smtClean="0"/>
-              <a:t>05/06/2021</a:t>
+              <a:t>07/06/2021</a:t>
             </a:fld>
             <a:endParaRPr lang="pt-BR"/>
           </a:p>
@@ -868,7 +873,7 @@
           <a:p>
             <a:fld id="{98F4D1EC-0385-4CF8-B82D-4C32D76D4122}" type="datetimeFigureOut">
               <a:rPr lang="pt-BR" smtClean="0"/>
-              <a:t>05/06/2021</a:t>
+              <a:t>07/06/2021</a:t>
             </a:fld>
             <a:endParaRPr lang="pt-BR"/>
           </a:p>
@@ -1143,7 +1148,7 @@
           <a:p>
             <a:fld id="{98F4D1EC-0385-4CF8-B82D-4C32D76D4122}" type="datetimeFigureOut">
               <a:rPr lang="pt-BR" smtClean="0"/>
-              <a:t>05/06/2021</a:t>
+              <a:t>07/06/2021</a:t>
             </a:fld>
             <a:endParaRPr lang="pt-BR"/>
           </a:p>
@@ -1408,7 +1413,7 @@
           <a:p>
             <a:fld id="{98F4D1EC-0385-4CF8-B82D-4C32D76D4122}" type="datetimeFigureOut">
               <a:rPr lang="pt-BR" smtClean="0"/>
-              <a:t>05/06/2021</a:t>
+              <a:t>07/06/2021</a:t>
             </a:fld>
             <a:endParaRPr lang="pt-BR"/>
           </a:p>
@@ -1820,7 +1825,7 @@
           <a:p>
             <a:fld id="{98F4D1EC-0385-4CF8-B82D-4C32D76D4122}" type="datetimeFigureOut">
               <a:rPr lang="pt-BR" smtClean="0"/>
-              <a:t>05/06/2021</a:t>
+              <a:t>07/06/2021</a:t>
             </a:fld>
             <a:endParaRPr lang="pt-BR"/>
           </a:p>
@@ -1961,7 +1966,7 @@
           <a:p>
             <a:fld id="{98F4D1EC-0385-4CF8-B82D-4C32D76D4122}" type="datetimeFigureOut">
               <a:rPr lang="pt-BR" smtClean="0"/>
-              <a:t>05/06/2021</a:t>
+              <a:t>07/06/2021</a:t>
             </a:fld>
             <a:endParaRPr lang="pt-BR"/>
           </a:p>
@@ -2074,7 +2079,7 @@
           <a:p>
             <a:fld id="{98F4D1EC-0385-4CF8-B82D-4C32D76D4122}" type="datetimeFigureOut">
               <a:rPr lang="pt-BR" smtClean="0"/>
-              <a:t>05/06/2021</a:t>
+              <a:t>07/06/2021</a:t>
             </a:fld>
             <a:endParaRPr lang="pt-BR"/>
           </a:p>
@@ -2385,7 +2390,7 @@
           <a:p>
             <a:fld id="{98F4D1EC-0385-4CF8-B82D-4C32D76D4122}" type="datetimeFigureOut">
               <a:rPr lang="pt-BR" smtClean="0"/>
-              <a:t>05/06/2021</a:t>
+              <a:t>07/06/2021</a:t>
             </a:fld>
             <a:endParaRPr lang="pt-BR"/>
           </a:p>
@@ -2673,7 +2678,7 @@
           <a:p>
             <a:fld id="{98F4D1EC-0385-4CF8-B82D-4C32D76D4122}" type="datetimeFigureOut">
               <a:rPr lang="pt-BR" smtClean="0"/>
-              <a:t>05/06/2021</a:t>
+              <a:t>07/06/2021</a:t>
             </a:fld>
             <a:endParaRPr lang="pt-BR"/>
           </a:p>
@@ -2914,7 +2919,7 @@
           <a:p>
             <a:fld id="{98F4D1EC-0385-4CF8-B82D-4C32D76D4122}" type="datetimeFigureOut">
               <a:rPr lang="pt-BR" smtClean="0"/>
-              <a:t>05/06/2021</a:t>
+              <a:t>07/06/2021</a:t>
             </a:fld>
             <a:endParaRPr lang="pt-BR"/>
           </a:p>
@@ -3427,13 +3432,13 @@
   <p:clrMapOvr>
     <a:masterClrMapping/>
   </p:clrMapOvr>
-  <mc:AlternateContent xmlns:mc="http://schemas.openxmlformats.org/markup-compatibility/2006">
-    <mc:Choice xmlns:p15="http://schemas.microsoft.com/office/powerpoint/2012/main" Requires="p15">
+  <mc:AlternateContent xmlns:mc="http://schemas.openxmlformats.org/markup-compatibility/2006" xmlns:p15="http://schemas.microsoft.com/office/powerpoint/2012/main">
+    <mc:Choice Requires="p15">
       <p:transition xmlns:p14="http://schemas.microsoft.com/office/powerpoint/2010/main" spd="slow" p14:dur="4000">
         <p15:prstTrans prst="curtains"/>
       </p:transition>
     </mc:Choice>
-    <mc:Fallback>
+    <mc:Fallback xmlns="">
       <p:transition spd="slow">
         <p:fade/>
       </p:transition>
@@ -3505,13 +3510,13 @@
   <p:clrMapOvr>
     <a:masterClrMapping/>
   </p:clrMapOvr>
-  <mc:AlternateContent xmlns:mc="http://schemas.openxmlformats.org/markup-compatibility/2006">
-    <mc:Choice xmlns:p15="http://schemas.microsoft.com/office/powerpoint/2012/main" Requires="p15">
+  <mc:AlternateContent xmlns:mc="http://schemas.openxmlformats.org/markup-compatibility/2006" xmlns:p15="http://schemas.microsoft.com/office/powerpoint/2012/main">
+    <mc:Choice Requires="p15">
       <p:transition xmlns:p14="http://schemas.microsoft.com/office/powerpoint/2010/main" spd="slow" p14:dur="1250">
         <p15:prstTrans prst="peelOff"/>
       </p:transition>
     </mc:Choice>
-    <mc:Fallback>
+    <mc:Fallback xmlns="">
       <p:transition spd="slow">
         <p:fade/>
       </p:transition>
@@ -3583,13 +3588,13 @@
   <p:clrMapOvr>
     <a:masterClrMapping/>
   </p:clrMapOvr>
-  <mc:AlternateContent xmlns:mc="http://schemas.openxmlformats.org/markup-compatibility/2006">
-    <mc:Choice xmlns:p15="http://schemas.microsoft.com/office/powerpoint/2012/main" Requires="p15">
+  <mc:AlternateContent xmlns:mc="http://schemas.openxmlformats.org/markup-compatibility/2006" xmlns:p15="http://schemas.microsoft.com/office/powerpoint/2012/main">
+    <mc:Choice Requires="p15">
       <p:transition xmlns:p14="http://schemas.microsoft.com/office/powerpoint/2010/main" spd="slow" p14:dur="3250">
         <p15:prstTrans prst="airplane"/>
       </p:transition>
     </mc:Choice>
-    <mc:Fallback>
+    <mc:Fallback xmlns="">
       <p:transition spd="slow">
         <p:fade/>
       </p:transition>
@@ -3661,13 +3666,13 @@
   <p:clrMapOvr>
     <a:masterClrMapping/>
   </p:clrMapOvr>
-  <mc:AlternateContent xmlns:mc="http://schemas.openxmlformats.org/markup-compatibility/2006">
-    <mc:Choice xmlns:p14="http://schemas.microsoft.com/office/powerpoint/2010/main" Requires="p14">
+  <mc:AlternateContent xmlns:mc="http://schemas.openxmlformats.org/markup-compatibility/2006" xmlns:p14="http://schemas.microsoft.com/office/powerpoint/2010/main">
+    <mc:Choice Requires="p14">
       <p:transition spd="slow" p14:dur="2000">
         <p:wheel spokes="1"/>
       </p:transition>
     </mc:Choice>
-    <mc:Fallback>
+    <mc:Fallback xmlns="">
       <p:transition spd="slow">
         <p:wheel spokes="1"/>
       </p:transition>
@@ -3695,10 +3700,10 @@
       </p:grpSpPr>
       <p:pic>
         <p:nvPicPr>
-          <p:cNvPr id="3" name="Imagem 2">
-            <a:extLst>
-              <a:ext uri="{FF2B5EF4-FFF2-40B4-BE49-F238E27FC236}">
-                <a16:creationId xmlns:a16="http://schemas.microsoft.com/office/drawing/2014/main" id="{E2C42829-ED47-4919-9A77-82994932BD0F}"/>
+          <p:cNvPr id="4" name="Imagem 3">
+            <a:extLst>
+              <a:ext uri="{FF2B5EF4-FFF2-40B4-BE49-F238E27FC236}">
+                <a16:creationId xmlns:a16="http://schemas.microsoft.com/office/drawing/2014/main" id="{1F215819-F0F7-4203-8DB2-491482CCF0C5}"/>
               </a:ext>
             </a:extLst>
           </p:cNvPr>
@@ -3739,13 +3744,13 @@
   <p:clrMapOvr>
     <a:masterClrMapping/>
   </p:clrMapOvr>
-  <mc:AlternateContent xmlns:mc="http://schemas.openxmlformats.org/markup-compatibility/2006">
-    <mc:Choice xmlns:p14="http://schemas.microsoft.com/office/powerpoint/2010/main" Requires="p14">
+  <mc:AlternateContent xmlns:mc="http://schemas.openxmlformats.org/markup-compatibility/2006" xmlns:p14="http://schemas.microsoft.com/office/powerpoint/2010/main">
+    <mc:Choice Requires="p14">
       <p:transition spd="slow" p14:dur="2000">
         <p:wheel spokes="1"/>
       </p:transition>
     </mc:Choice>
-    <mc:Fallback>
+    <mc:Fallback xmlns="">
       <p:transition spd="slow">
         <p:wheel spokes="1"/>
       </p:transition>
@@ -3817,13 +3822,13 @@
   <p:clrMapOvr>
     <a:masterClrMapping/>
   </p:clrMapOvr>
-  <mc:AlternateContent xmlns:mc="http://schemas.openxmlformats.org/markup-compatibility/2006">
-    <mc:Choice xmlns:p14="http://schemas.microsoft.com/office/powerpoint/2010/main" Requires="p14">
+  <mc:AlternateContent xmlns:mc="http://schemas.openxmlformats.org/markup-compatibility/2006" xmlns:p14="http://schemas.microsoft.com/office/powerpoint/2010/main">
+    <mc:Choice Requires="p14">
       <p:transition spd="slow" p14:dur="2000">
         <p:wheel spokes="1"/>
       </p:transition>
     </mc:Choice>
-    <mc:Fallback>
+    <mc:Fallback xmlns="">
       <p:transition spd="slow">
         <p:wheel spokes="1"/>
       </p:transition>
@@ -3895,13 +3900,13 @@
   <p:clrMapOvr>
     <a:masterClrMapping/>
   </p:clrMapOvr>
-  <mc:AlternateContent xmlns:mc="http://schemas.openxmlformats.org/markup-compatibility/2006">
-    <mc:Choice xmlns:p14="http://schemas.microsoft.com/office/powerpoint/2010/main" Requires="p14">
+  <mc:AlternateContent xmlns:mc="http://schemas.openxmlformats.org/markup-compatibility/2006" xmlns:p14="http://schemas.microsoft.com/office/powerpoint/2010/main">
+    <mc:Choice Requires="p14">
       <p:transition spd="slow" p14:dur="2000">
         <p:wheel spokes="1"/>
       </p:transition>
     </mc:Choice>
-    <mc:Fallback>
+    <mc:Fallback xmlns="">
       <p:transition spd="slow">
         <p:wheel spokes="1"/>
       </p:transition>
@@ -3973,13 +3978,13 @@
   <p:clrMapOvr>
     <a:masterClrMapping/>
   </p:clrMapOvr>
-  <mc:AlternateContent xmlns:mc="http://schemas.openxmlformats.org/markup-compatibility/2006">
-    <mc:Choice xmlns:p14="http://schemas.microsoft.com/office/powerpoint/2010/main" Requires="p14">
+  <mc:AlternateContent xmlns:mc="http://schemas.openxmlformats.org/markup-compatibility/2006" xmlns:p14="http://schemas.microsoft.com/office/powerpoint/2010/main">
+    <mc:Choice Requires="p14">
       <p:transition spd="slow" p14:dur="2000">
         <p:wheel spokes="1"/>
       </p:transition>
     </mc:Choice>
-    <mc:Fallback>
+    <mc:Fallback xmlns="">
       <p:transition spd="slow">
         <p:wheel spokes="1"/>
       </p:transition>
@@ -4051,13 +4056,13 @@
   <p:clrMapOvr>
     <a:masterClrMapping/>
   </p:clrMapOvr>
-  <mc:AlternateContent xmlns:mc="http://schemas.openxmlformats.org/markup-compatibility/2006">
-    <mc:Choice xmlns:p15="http://schemas.microsoft.com/office/powerpoint/2012/main" Requires="p15">
+  <mc:AlternateContent xmlns:mc="http://schemas.openxmlformats.org/markup-compatibility/2006" xmlns:p15="http://schemas.microsoft.com/office/powerpoint/2012/main">
+    <mc:Choice Requires="p15">
       <p:transition xmlns:p14="http://schemas.microsoft.com/office/powerpoint/2010/main" spd="slow" p14:dur="1250">
         <p15:prstTrans prst="peelOff"/>
       </p:transition>
     </mc:Choice>
-    <mc:Fallback>
+    <mc:Fallback xmlns="">
       <p:transition spd="slow">
         <p:fade/>
       </p:transition>
@@ -4129,13 +4134,13 @@
   <p:clrMapOvr>
     <a:masterClrMapping/>
   </p:clrMapOvr>
-  <mc:AlternateContent xmlns:mc="http://schemas.openxmlformats.org/markup-compatibility/2006">
-    <mc:Choice xmlns:p15="http://schemas.microsoft.com/office/powerpoint/2012/main" Requires="p15">
+  <mc:AlternateContent xmlns:mc="http://schemas.openxmlformats.org/markup-compatibility/2006" xmlns:p15="http://schemas.microsoft.com/office/powerpoint/2012/main">
+    <mc:Choice Requires="p15">
       <p:transition xmlns:p14="http://schemas.microsoft.com/office/powerpoint/2010/main" spd="slow" p14:dur="1250">
         <p15:prstTrans prst="peelOff"/>
       </p:transition>
     </mc:Choice>
-    <mc:Fallback>
+    <mc:Fallback xmlns="">
       <p:transition spd="slow">
         <p:fade/>
       </p:transition>
@@ -4207,13 +4212,13 @@
   <p:clrMapOvr>
     <a:masterClrMapping/>
   </p:clrMapOvr>
-  <mc:AlternateContent xmlns:mc="http://schemas.openxmlformats.org/markup-compatibility/2006">
-    <mc:Choice xmlns:p15="http://schemas.microsoft.com/office/powerpoint/2012/main" Requires="p15">
+  <mc:AlternateContent xmlns:mc="http://schemas.openxmlformats.org/markup-compatibility/2006" xmlns:p15="http://schemas.microsoft.com/office/powerpoint/2012/main">
+    <mc:Choice Requires="p15">
       <p:transition xmlns:p14="http://schemas.microsoft.com/office/powerpoint/2010/main" spd="slow" p14:dur="1250">
         <p15:prstTrans prst="peelOff"/>
       </p:transition>
     </mc:Choice>
-    <mc:Fallback>
+    <mc:Fallback xmlns="">
       <p:transition spd="slow">
         <p:fade/>
       </p:transition>

</xml_diff>